<commit_message>
Finished C# code and fitnesse pages almost ready
</commit_message>
<xml_diff>
--- a/Sheets/ATDD short.pptx
+++ b/Sheets/ATDD short.pptx
@@ -11,10 +11,10 @@
     <p:sldMasterId id="2147483715" r:id="rId10"/>
   </p:sldMasterIdLst>
   <p:notesMasterIdLst>
-    <p:notesMasterId r:id="rId24"/>
+    <p:notesMasterId r:id="rId25"/>
   </p:notesMasterIdLst>
   <p:handoutMasterIdLst>
-    <p:handoutMasterId r:id="rId25"/>
+    <p:handoutMasterId r:id="rId26"/>
   </p:handoutMasterIdLst>
   <p:sldIdLst>
     <p:sldId id="261" r:id="rId11"/>
@@ -26,10 +26,11 @@
     <p:sldId id="265" r:id="rId17"/>
     <p:sldId id="266" r:id="rId18"/>
     <p:sldId id="256" r:id="rId19"/>
-    <p:sldId id="268" r:id="rId20"/>
-    <p:sldId id="269" r:id="rId21"/>
+    <p:sldId id="269" r:id="rId20"/>
+    <p:sldId id="268" r:id="rId21"/>
     <p:sldId id="272" r:id="rId22"/>
-    <p:sldId id="273" r:id="rId23"/>
+    <p:sldId id="274" r:id="rId23"/>
+    <p:sldId id="273" r:id="rId24"/>
   </p:sldIdLst>
   <p:sldSz cx="9144000" cy="6858000" type="screen4x3"/>
   <p:notesSz cx="6858000" cy="9144000"/>
@@ -214,7 +215,7 @@
             <a:fld id="{F304320F-98E5-4384-A447-7E1FA9E54365}" type="datetimeFigureOut">
               <a:rPr lang="nl-NL" smtClean="0"/>
               <a:pPr/>
-              <a:t>17-8-2010</a:t>
+              <a:t>25-8-2010</a:t>
             </a:fld>
             <a:endParaRPr lang="nl-NL"/>
           </a:p>
@@ -381,7 +382,7 @@
             <a:fld id="{FA2A00F8-FC11-47B8-9F9F-FE8B1918C2CA}" type="datetimeFigureOut">
               <a:rPr lang="nl-NL" smtClean="0"/>
               <a:pPr/>
-              <a:t>17-8-2010</a:t>
+              <a:t>25-8-2010</a:t>
             </a:fld>
             <a:endParaRPr lang="nl-NL"/>
           </a:p>
@@ -706,7 +707,55 @@
                 <a:ea typeface="+mn-ea"/>
                 <a:cs typeface="+mn-cs"/>
               </a:rPr>
-              <a:t>We kunnen gebruiken allerlei technieken gebruiken die helpen bij het verbeteren van projecten en helpen bij het verhogen van de kwaliteit van de code. Zo gebruiken we TDD, design </a:t>
+              <a:t>We </a:t>
+            </a:r>
+            <a:r>
+              <a:rPr lang="nl-NL" sz="1200" kern="1200" dirty="0" smtClean="0">
+                <a:solidFill>
+                  <a:schemeClr val="tx1"/>
+                </a:solidFill>
+                <a:effectLst/>
+                <a:latin typeface="+mn-lt"/>
+                <a:ea typeface="+mn-ea"/>
+                <a:cs typeface="+mn-cs"/>
+              </a:rPr>
+              <a:t>kunnen allerlei technieken</a:t>
+            </a:r>
+            <a:r>
+              <a:rPr lang="nl-NL" sz="1200" kern="1200" baseline="0" dirty="0" smtClean="0">
+                <a:solidFill>
+                  <a:schemeClr val="tx1"/>
+                </a:solidFill>
+                <a:effectLst/>
+                <a:latin typeface="+mn-lt"/>
+                <a:ea typeface="+mn-ea"/>
+                <a:cs typeface="+mn-cs"/>
+              </a:rPr>
+              <a:t> </a:t>
+            </a:r>
+            <a:r>
+              <a:rPr lang="nl-NL" sz="1200" kern="1200" dirty="0" smtClean="0">
+                <a:solidFill>
+                  <a:schemeClr val="tx1"/>
+                </a:solidFill>
+                <a:effectLst/>
+                <a:latin typeface="+mn-lt"/>
+                <a:ea typeface="+mn-ea"/>
+                <a:cs typeface="+mn-cs"/>
+              </a:rPr>
+              <a:t>gebruiken </a:t>
+            </a:r>
+            <a:r>
+              <a:rPr lang="nl-NL" sz="1200" kern="1200" dirty="0" smtClean="0">
+                <a:solidFill>
+                  <a:schemeClr val="tx1"/>
+                </a:solidFill>
+                <a:effectLst/>
+                <a:latin typeface="+mn-lt"/>
+                <a:ea typeface="+mn-ea"/>
+                <a:cs typeface="+mn-cs"/>
+              </a:rPr>
+              <a:t>die helpen bij het verbeteren van projecten en helpen bij het verhogen van de kwaliteit van de code. Zo gebruiken we TDD, design </a:t>
             </a:r>
             <a:r>
               <a:rPr lang="nl-NL" sz="1200" kern="1200" dirty="0" err="1" smtClean="0">
@@ -909,7 +958,19 @@
                 <a:ea typeface="+mn-ea"/>
                 <a:cs typeface="+mn-cs"/>
               </a:rPr>
-              <a:t>TDD helpt ons bij het ontwikkelen van hoge kwaliteits code. De klant betaalt echter niet voor code, maar voor functionerende software. ATDD lijkt op TDD, maar dan op feature niveau. </a:t>
+              <a:t>ATDD </a:t>
+            </a:r>
+            <a:r>
+              <a:rPr lang="nl-NL" sz="1200" kern="1200" dirty="0" smtClean="0">
+                <a:solidFill>
+                  <a:schemeClr val="tx1"/>
+                </a:solidFill>
+                <a:effectLst/>
+                <a:latin typeface="+mn-lt"/>
+                <a:ea typeface="+mn-ea"/>
+                <a:cs typeface="+mn-cs"/>
+              </a:rPr>
+              <a:t>lijkt op TDD, maar dan op feature niveau. </a:t>
             </a:r>
           </a:p>
           <a:p>
@@ -1317,7 +1378,43 @@
                 <a:ea typeface="+mn-ea"/>
                 <a:cs typeface="+mn-cs"/>
               </a:rPr>
-              <a:t>Acceptatie tests worden samen met de klant geschreven. In eerste instantie kan dit voor de sprint op de achterkant van een CRC kaart.  Op het moment dat een user story wordt uitgezocht wordt de test verder uitgewerkt in combinatie met de klant. In sommige gevallen zijn de tests al verder uitgewerkt voor de sprint begint of in een soort workshop. De ontwikkelaar kiest dus een user story, werkt vervolgens de test verder uit met de klant. Daarnaar zorgt de ontwikkelaar dat de test uitvoerbaar wordt door de “testdriver” te implementeren. Vervolgens wordt de code geïmplementeerd en als de tests slagen wordt de volgende user story opgepakt. Per user story wordt er minimaal 1 acceptatie test gemaakt. De sprint is pas klaar als alle acceptatie testen groen zijn.</a:t>
+              <a:t>Acceptatie tests worden samen met de klant geschreven. In eerste instantie kan dit voor de sprint op de achterkant van een CRC kaart.  Op het moment dat een user story wordt uitgezocht wordt de test verder uitgewerkt in combinatie met de klant. In sommige gevallen zijn de tests al verder uitgewerkt voor de sprint begint of in een soort workshop. De ontwikkelaar kiest dus een user story, werkt vervolgens de test verder uit met de klant. Daarnaar zorgt de ontwikkelaar dat de test uitvoerbaar wordt door de “</a:t>
+            </a:r>
+            <a:r>
+              <a:rPr lang="nl-NL" sz="1200" kern="1200" dirty="0" err="1" smtClean="0">
+                <a:solidFill>
+                  <a:schemeClr val="tx1"/>
+                </a:solidFill>
+                <a:effectLst/>
+                <a:latin typeface="+mn-lt"/>
+                <a:ea typeface="+mn-ea"/>
+                <a:cs typeface="+mn-cs"/>
+              </a:rPr>
+              <a:t>testfixture</a:t>
+            </a:r>
+            <a:r>
+              <a:rPr lang="nl-NL" sz="1200" kern="1200" dirty="0" smtClean="0">
+                <a:solidFill>
+                  <a:schemeClr val="tx1"/>
+                </a:solidFill>
+                <a:effectLst/>
+                <a:latin typeface="+mn-lt"/>
+                <a:ea typeface="+mn-ea"/>
+                <a:cs typeface="+mn-cs"/>
+              </a:rPr>
+              <a:t>” </a:t>
+            </a:r>
+            <a:r>
+              <a:rPr lang="nl-NL" sz="1200" kern="1200" dirty="0" smtClean="0">
+                <a:solidFill>
+                  <a:schemeClr val="tx1"/>
+                </a:solidFill>
+                <a:effectLst/>
+                <a:latin typeface="+mn-lt"/>
+                <a:ea typeface="+mn-ea"/>
+                <a:cs typeface="+mn-cs"/>
+              </a:rPr>
+              <a:t>te implementeren. Vervolgens wordt de code geïmplementeerd en als de tests slagen wordt de volgende user story opgepakt. Per user story wordt er minimaal 1 acceptatie test gemaakt. De sprint is pas klaar als alle acceptatie testen groen zijn.</a:t>
             </a:r>
           </a:p>
           <a:p>
@@ -1436,7 +1533,7 @@
               <a:t>De test moet vooral beknopt zijn en dus alleen de essentie van de functionaliteit weergeven. Hierdoor kan het beter als </a:t>
             </a:r>
             <a:r>
-              <a:rPr lang="nl-NL" sz="1200" kern="1200" dirty="0" err="1" smtClean="0">
+              <a:rPr lang="nl-NL" sz="1200" kern="1200" dirty="0" smtClean="0">
                 <a:solidFill>
                   <a:schemeClr val="tx1"/>
                 </a:solidFill>
@@ -1445,7 +1542,7 @@
                 <a:ea typeface="+mn-ea"/>
                 <a:cs typeface="+mn-cs"/>
               </a:rPr>
-              <a:t>communictiemiddel</a:t>
+              <a:t>communicatiemiddel </a:t>
             </a:r>
             <a:r>
               <a:rPr lang="nl-NL" sz="1200" kern="1200" dirty="0" smtClean="0">
@@ -1457,7 +1554,7 @@
                 <a:ea typeface="+mn-ea"/>
                 <a:cs typeface="+mn-cs"/>
               </a:rPr>
-              <a:t> worden gebruikt, maar is het ook beter te onderhouden. Gericht op het wat, omdat het hoe voor de business </a:t>
+              <a:t>worden gebruikt, maar is het ook beter te onderhouden. Gericht op het wat, omdat het hoe voor de business </a:t>
             </a:r>
             <a:r>
               <a:rPr lang="nl-NL" sz="1200" kern="1200" dirty="0" err="1" smtClean="0">
@@ -2088,7 +2185,7 @@
             <a:fld id="{AE17075B-ACB5-4731-8BAE-4E16BB85959E}" type="slidenum">
               <a:rPr lang="nl-NL" smtClean="0"/>
               <a:pPr/>
-              <a:t>10</a:t>
+              <a:t>11</a:t>
             </a:fld>
             <a:endParaRPr lang="nl-NL"/>
           </a:p>
@@ -14094,7 +14191,7 @@
                 </a:solidFill>
               </a:rPr>
               <a:pPr algn="r"/>
-              <a:t>17 augustus 2010</a:t>
+              <a:t>25 augustus 2010</a:t>
             </a:fld>
             <a:endParaRPr lang="nl-NL" sz="1050" dirty="0">
               <a:solidFill>
@@ -14694,7 +14791,7 @@
                 </a:solidFill>
               </a:rPr>
               <a:pPr algn="r"/>
-              <a:t>17 augustus 2010</a:t>
+              <a:t>25 augustus 2010</a:t>
             </a:fld>
             <a:endParaRPr lang="nl-NL" sz="1050" dirty="0">
               <a:solidFill>
@@ -15396,7 +15493,7 @@
                 </a:solidFill>
               </a:rPr>
               <a:pPr algn="r"/>
-              <a:t>17 augustus 2010</a:t>
+              <a:t>25 augustus 2010</a:t>
             </a:fld>
             <a:endParaRPr lang="nl-NL" sz="1050" dirty="0">
               <a:solidFill>
@@ -16025,7 +16122,7 @@
                 </a:solidFill>
               </a:rPr>
               <a:pPr algn="r"/>
-              <a:t>17 augustus 2010</a:t>
+              <a:t>25 augustus 2010</a:t>
             </a:fld>
             <a:endParaRPr lang="nl-NL" sz="1050" dirty="0">
               <a:solidFill>
@@ -16687,7 +16784,7 @@
                 </a:solidFill>
               </a:rPr>
               <a:pPr algn="r"/>
-              <a:t>17 augustus 2010</a:t>
+              <a:t>25 augustus 2010</a:t>
             </a:fld>
             <a:endParaRPr lang="nl-NL" sz="1050" dirty="0">
               <a:solidFill>
@@ -17349,7 +17446,7 @@
                 </a:solidFill>
               </a:rPr>
               <a:pPr algn="r"/>
-              <a:t>17 augustus 2010</a:t>
+              <a:t>25 augustus 2010</a:t>
             </a:fld>
             <a:endParaRPr lang="nl-NL" sz="1050" dirty="0">
               <a:solidFill>
@@ -18010,7 +18107,7 @@
                 </a:solidFill>
               </a:rPr>
               <a:pPr algn="r"/>
-              <a:t>17 augustus 2010</a:t>
+              <a:t>25 augustus 2010</a:t>
             </a:fld>
             <a:endParaRPr lang="nl-NL" sz="1050" dirty="0">
               <a:solidFill>
@@ -18408,7 +18505,15 @@
           <a:bodyPr/>
           <a:lstStyle/>
           <a:p>
-            <a:endParaRPr lang="nl-NL"/>
+            <a:r>
+              <a:rPr lang="en-US" dirty="0" err="1" smtClean="0"/>
+              <a:t>Fitnesse</a:t>
+            </a:r>
+            <a:r>
+              <a:rPr lang="en-US" dirty="0" smtClean="0"/>
+              <a:t> workshop</a:t>
+            </a:r>
+            <a:endParaRPr lang="nl-NL" dirty="0"/>
           </a:p>
         </p:txBody>
       </p:sp>
@@ -18480,6 +18585,129 @@
       </p:grpSpPr>
       <p:sp>
         <p:nvSpPr>
+          <p:cNvPr id="2" name="Content Placeholder 1"/>
+          <p:cNvSpPr>
+            <a:spLocks noGrp="1"/>
+          </p:cNvSpPr>
+          <p:nvPr>
+            <p:ph idx="1"/>
+          </p:nvPr>
+        </p:nvSpPr>
+        <p:spPr/>
+        <p:txBody>
+          <a:bodyPr/>
+          <a:lstStyle/>
+          <a:p>
+            <a:r>
+              <a:rPr lang="en-US" dirty="0" smtClean="0"/>
+              <a:t>Decision table (</a:t>
+            </a:r>
+            <a:r>
+              <a:rPr lang="en-US" dirty="0" err="1" smtClean="0"/>
+              <a:t>Tabel</a:t>
+            </a:r>
+            <a:r>
+              <a:rPr lang="en-US" dirty="0" smtClean="0"/>
+              <a:t>)</a:t>
+            </a:r>
+          </a:p>
+          <a:p>
+            <a:r>
+              <a:rPr lang="en-US" dirty="0" smtClean="0"/>
+              <a:t>Query table</a:t>
+            </a:r>
+          </a:p>
+          <a:p>
+            <a:r>
+              <a:rPr lang="en-US" dirty="0" smtClean="0"/>
+              <a:t>Script table</a:t>
+            </a:r>
+          </a:p>
+          <a:p>
+            <a:r>
+              <a:rPr lang="en-US" dirty="0" smtClean="0"/>
+              <a:t>Scenario table (BDD)</a:t>
+            </a:r>
+            <a:endParaRPr lang="en-US" dirty="0"/>
+          </a:p>
+        </p:txBody>
+      </p:sp>
+      <p:sp>
+        <p:nvSpPr>
+          <p:cNvPr id="3" name="Title 2"/>
+          <p:cNvSpPr>
+            <a:spLocks noGrp="1"/>
+          </p:cNvSpPr>
+          <p:nvPr>
+            <p:ph type="title"/>
+          </p:nvPr>
+        </p:nvSpPr>
+        <p:spPr/>
+        <p:txBody>
+          <a:bodyPr/>
+          <a:lstStyle/>
+          <a:p>
+            <a:r>
+              <a:rPr lang="en-US" dirty="0" smtClean="0"/>
+              <a:t>Slim fixtures</a:t>
+            </a:r>
+            <a:endParaRPr lang="en-US" dirty="0"/>
+          </a:p>
+        </p:txBody>
+      </p:sp>
+      <p:sp>
+        <p:nvSpPr>
+          <p:cNvPr id="4" name="Text Placeholder 3"/>
+          <p:cNvSpPr>
+            <a:spLocks noGrp="1"/>
+          </p:cNvSpPr>
+          <p:nvPr>
+            <p:ph type="body" sz="quarter" idx="13"/>
+          </p:nvPr>
+        </p:nvSpPr>
+        <p:spPr/>
+        <p:txBody>
+          <a:bodyPr/>
+          <a:lstStyle/>
+          <a:p>
+            <a:endParaRPr lang="en-US"/>
+          </a:p>
+        </p:txBody>
+      </p:sp>
+    </p:spTree>
+  </p:cSld>
+  <p:clrMapOvr>
+    <a:masterClrMapping/>
+  </p:clrMapOvr>
+  <p:timing>
+    <p:tnLst>
+      <p:par>
+        <p:cTn id="1" dur="indefinite" restart="never" nodeType="tmRoot"/>
+      </p:par>
+    </p:tnLst>
+  </p:timing>
+</p:sld>
+</file>
+
+<file path=ppt/slides/slide11.xml><?xml version="1.0" encoding="utf-8"?>
+<p:sld xmlns:a="http://schemas.openxmlformats.org/drawingml/2006/main" xmlns:r="http://schemas.openxmlformats.org/officeDocument/2006/relationships" xmlns:p="http://schemas.openxmlformats.org/presentationml/2006/main">
+  <p:cSld>
+    <p:spTree>
+      <p:nvGrpSpPr>
+        <p:cNvPr id="1" name=""/>
+        <p:cNvGrpSpPr/>
+        <p:nvPr/>
+      </p:nvGrpSpPr>
+      <p:grpSpPr>
+        <a:xfrm>
+          <a:off x="0" y="0"/>
+          <a:ext cx="0" cy="0"/>
+          <a:chOff x="0" y="0"/>
+          <a:chExt cx="0" cy="0"/>
+        </a:xfrm>
+      </p:grpSpPr>
+      <p:sp>
+        <p:nvSpPr>
           <p:cNvPr id="99" name="Title 98"/>
           <p:cNvSpPr>
             <a:spLocks noGrp="1"/>
@@ -18760,129 +18988,6 @@
 </p:sld>
 </file>
 
-<file path=ppt/slides/slide11.xml><?xml version="1.0" encoding="utf-8"?>
-<p:sld xmlns:a="http://schemas.openxmlformats.org/drawingml/2006/main" xmlns:r="http://schemas.openxmlformats.org/officeDocument/2006/relationships" xmlns:p="http://schemas.openxmlformats.org/presentationml/2006/main">
-  <p:cSld>
-    <p:spTree>
-      <p:nvGrpSpPr>
-        <p:cNvPr id="1" name=""/>
-        <p:cNvGrpSpPr/>
-        <p:nvPr/>
-      </p:nvGrpSpPr>
-      <p:grpSpPr>
-        <a:xfrm>
-          <a:off x="0" y="0"/>
-          <a:ext cx="0" cy="0"/>
-          <a:chOff x="0" y="0"/>
-          <a:chExt cx="0" cy="0"/>
-        </a:xfrm>
-      </p:grpSpPr>
-      <p:sp>
-        <p:nvSpPr>
-          <p:cNvPr id="2" name="Content Placeholder 1"/>
-          <p:cNvSpPr>
-            <a:spLocks noGrp="1"/>
-          </p:cNvSpPr>
-          <p:nvPr>
-            <p:ph idx="1"/>
-          </p:nvPr>
-        </p:nvSpPr>
-        <p:spPr/>
-        <p:txBody>
-          <a:bodyPr/>
-          <a:lstStyle/>
-          <a:p>
-            <a:r>
-              <a:rPr lang="en-US" dirty="0" smtClean="0"/>
-              <a:t>Decision table (</a:t>
-            </a:r>
-            <a:r>
-              <a:rPr lang="en-US" dirty="0" err="1" smtClean="0"/>
-              <a:t>Tabel</a:t>
-            </a:r>
-            <a:r>
-              <a:rPr lang="en-US" dirty="0" smtClean="0"/>
-              <a:t>)</a:t>
-            </a:r>
-          </a:p>
-          <a:p>
-            <a:r>
-              <a:rPr lang="en-US" dirty="0" smtClean="0"/>
-              <a:t>Query table</a:t>
-            </a:r>
-          </a:p>
-          <a:p>
-            <a:r>
-              <a:rPr lang="en-US" dirty="0" smtClean="0"/>
-              <a:t>Script table</a:t>
-            </a:r>
-          </a:p>
-          <a:p>
-            <a:r>
-              <a:rPr lang="en-US" dirty="0" smtClean="0"/>
-              <a:t>Scenario table (BDD)</a:t>
-            </a:r>
-            <a:endParaRPr lang="en-US" dirty="0"/>
-          </a:p>
-        </p:txBody>
-      </p:sp>
-      <p:sp>
-        <p:nvSpPr>
-          <p:cNvPr id="3" name="Title 2"/>
-          <p:cNvSpPr>
-            <a:spLocks noGrp="1"/>
-          </p:cNvSpPr>
-          <p:nvPr>
-            <p:ph type="title"/>
-          </p:nvPr>
-        </p:nvSpPr>
-        <p:spPr/>
-        <p:txBody>
-          <a:bodyPr/>
-          <a:lstStyle/>
-          <a:p>
-            <a:r>
-              <a:rPr lang="en-US" dirty="0" smtClean="0"/>
-              <a:t>Slim fixtures</a:t>
-            </a:r>
-            <a:endParaRPr lang="en-US" dirty="0"/>
-          </a:p>
-        </p:txBody>
-      </p:sp>
-      <p:sp>
-        <p:nvSpPr>
-          <p:cNvPr id="4" name="Text Placeholder 3"/>
-          <p:cNvSpPr>
-            <a:spLocks noGrp="1"/>
-          </p:cNvSpPr>
-          <p:nvPr>
-            <p:ph type="body" sz="quarter" idx="13"/>
-          </p:nvPr>
-        </p:nvSpPr>
-        <p:spPr/>
-        <p:txBody>
-          <a:bodyPr/>
-          <a:lstStyle/>
-          <a:p>
-            <a:endParaRPr lang="en-US"/>
-          </a:p>
-        </p:txBody>
-      </p:sp>
-    </p:spTree>
-  </p:cSld>
-  <p:clrMapOvr>
-    <a:masterClrMapping/>
-  </p:clrMapOvr>
-  <p:timing>
-    <p:tnLst>
-      <p:par>
-        <p:cTn id="1" dur="indefinite" restart="never" nodeType="tmRoot"/>
-      </p:par>
-    </p:tnLst>
-  </p:timing>
-</p:sld>
-</file>
-
 <file path=ppt/slides/slide12.xml><?xml version="1.0" encoding="utf-8"?>
 <p:sld xmlns:a="http://schemas.openxmlformats.org/drawingml/2006/main" xmlns:r="http://schemas.openxmlformats.org/officeDocument/2006/relationships" xmlns:p="http://schemas.openxmlformats.org/presentationml/2006/main">
   <p:cSld>
@@ -19023,6 +19128,81 @@
 </file>
 
 <file path=ppt/slides/slide13.xml><?xml version="1.0" encoding="utf-8"?>
+<p:sld xmlns:a="http://schemas.openxmlformats.org/drawingml/2006/main" xmlns:r="http://schemas.openxmlformats.org/officeDocument/2006/relationships" xmlns:p="http://schemas.openxmlformats.org/presentationml/2006/main">
+  <p:cSld>
+    <p:spTree>
+      <p:nvGrpSpPr>
+        <p:cNvPr id="1" name=""/>
+        <p:cNvGrpSpPr/>
+        <p:nvPr/>
+      </p:nvGrpSpPr>
+      <p:grpSpPr>
+        <a:xfrm>
+          <a:off x="0" y="0"/>
+          <a:ext cx="0" cy="0"/>
+          <a:chOff x="0" y="0"/>
+          <a:chExt cx="0" cy="0"/>
+        </a:xfrm>
+      </p:grpSpPr>
+      <p:sp>
+        <p:nvSpPr>
+          <p:cNvPr id="2" name="Content Placeholder 1"/>
+          <p:cNvSpPr>
+            <a:spLocks noGrp="1"/>
+          </p:cNvSpPr>
+          <p:nvPr>
+            <p:ph idx="1"/>
+          </p:nvPr>
+        </p:nvSpPr>
+        <p:spPr/>
+        <p:txBody>
+          <a:bodyPr/>
+          <a:lstStyle/>
+          <a:p>
+            <a:pPr marL="0" indent="0" algn="ctr">
+              <a:buNone/>
+            </a:pPr>
+            <a:r>
+              <a:rPr lang="en-US" sz="8000" dirty="0" smtClean="0"/>
+              <a:t>Workshop</a:t>
+            </a:r>
+            <a:endParaRPr lang="nl-NL" sz="8000" dirty="0"/>
+          </a:p>
+        </p:txBody>
+      </p:sp>
+      <p:sp>
+        <p:nvSpPr>
+          <p:cNvPr id="4" name="Text Placeholder 3"/>
+          <p:cNvSpPr>
+            <a:spLocks noGrp="1"/>
+          </p:cNvSpPr>
+          <p:nvPr>
+            <p:ph type="body" sz="quarter" idx="13"/>
+          </p:nvPr>
+        </p:nvSpPr>
+        <p:spPr/>
+        <p:txBody>
+          <a:bodyPr/>
+          <a:lstStyle/>
+          <a:p>
+            <a:endParaRPr lang="nl-NL"/>
+          </a:p>
+        </p:txBody>
+      </p:sp>
+    </p:spTree>
+    <p:extLst>
+      <p:ext uri="{BB962C8B-B14F-4D97-AF65-F5344CB8AC3E}">
+        <p14:creationId xmlns:p14="http://schemas.microsoft.com/office/powerpoint/2010/main" val="285922014"/>
+      </p:ext>
+    </p:extLst>
+  </p:cSld>
+  <p:clrMapOvr>
+    <a:masterClrMapping/>
+  </p:clrMapOvr>
+</p:sld>
+</file>
+
+<file path=ppt/slides/slide14.xml><?xml version="1.0" encoding="utf-8"?>
 <p:sld xmlns:a="http://schemas.openxmlformats.org/drawingml/2006/main" xmlns:r="http://schemas.openxmlformats.org/officeDocument/2006/relationships" xmlns:p="http://schemas.openxmlformats.org/presentationml/2006/main">
   <p:cSld>
     <p:spTree>
@@ -23839,6 +24019,21 @@
 </file>
 
 <file path=customXml/item1.xml><?xml version="1.0" encoding="utf-8"?>
+<p:properties xmlns:p="http://schemas.microsoft.com/office/2006/metadata/properties" xmlns:xsi="http://www.w3.org/2001/XMLSchema-instance">
+  <documentManagement/>
+</p:properties>
+</file>
+
+<file path=customXml/item2.xml><?xml version="1.0" encoding="utf-8"?>
+<?mso-contentType ?>
+<FormTemplates xmlns="http://schemas.microsoft.com/sharepoint/v3/contenttype/forms">
+  <Display>DocumentLibraryForm</Display>
+  <Edit>DocumentLibraryForm</Edit>
+  <New>DocumentLibraryForm</New>
+</FormTemplates>
+</file>
+
+<file path=customXml/item3.xml><?xml version="1.0" encoding="utf-8"?>
 <ct:contentTypeSchema xmlns:ct="http://schemas.microsoft.com/office/2006/metadata/contentType" xmlns:ma="http://schemas.microsoft.com/office/2006/metadata/properties/metaAttributes" ct:_="" ma:_="" ma:contentTypeName="Document" ma:contentTypeID="0x010100D66177275A172946932B34D9FBDD7F4E" ma:contentTypeVersion="0" ma:contentTypeDescription="Create a new document." ma:contentTypeScope="" ma:versionID="abc48664ac65c08541010e034649ec05">
   <xsd:schema xmlns:xsd="http://www.w3.org/2001/XMLSchema" xmlns:p="http://schemas.microsoft.com/office/2006/metadata/properties" targetNamespace="http://schemas.microsoft.com/office/2006/metadata/properties" ma:root="true" ma:fieldsID="865d2121b74b742f14ccc5899f7500b5">
     <xsd:element name="properties">
@@ -23887,32 +24082,16 @@
 </ct:contentTypeSchema>
 </file>
 
-<file path=customXml/item2.xml><?xml version="1.0" encoding="utf-8"?>
-<?mso-contentType ?>
-<FormTemplates xmlns="http://schemas.microsoft.com/sharepoint/v3/contenttype/forms">
-  <Display>DocumentLibraryForm</Display>
-  <Edit>DocumentLibraryForm</Edit>
-  <New>DocumentLibraryForm</New>
-</FormTemplates>
-</file>
-
-<file path=customXml/item3.xml><?xml version="1.0" encoding="utf-8"?>
-<p:properties xmlns:p="http://schemas.microsoft.com/office/2006/metadata/properties" xmlns:xsi="http://www.w3.org/2001/XMLSchema-instance">
-  <documentManagement/>
-</p:properties>
-</file>
-
 <file path=customXml/itemProps1.xml><?xml version="1.0" encoding="utf-8"?>
-<ds:datastoreItem xmlns:ds="http://schemas.openxmlformats.org/officeDocument/2006/customXml" ds:itemID="{A14ECCB8-3756-45F9-BC21-1DB5DA524804}">
+<ds:datastoreItem xmlns:ds="http://schemas.openxmlformats.org/officeDocument/2006/customXml" ds:itemID="{575908DB-6131-4DD1-90FB-C4742EE803F7}">
   <ds:schemaRefs>
-    <ds:schemaRef ds:uri="http://schemas.microsoft.com/office/2006/metadata/contentType"/>
-    <ds:schemaRef ds:uri="http://schemas.microsoft.com/office/2006/metadata/properties/metaAttributes"/>
-    <ds:schemaRef ds:uri="http://www.w3.org/2001/XMLSchema"/>
+    <ds:schemaRef ds:uri="http://purl.org/dc/elements/1.1/"/>
+    <ds:schemaRef ds:uri="http://purl.org/dc/terms/"/>
+    <ds:schemaRef ds:uri="http://www.w3.org/XML/1998/namespace"/>
+    <ds:schemaRef ds:uri="http://purl.org/dc/dcmitype/"/>
+    <ds:schemaRef ds:uri="http://schemas.microsoft.com/office/2006/documentManagement/types"/>
     <ds:schemaRef ds:uri="http://schemas.microsoft.com/office/2006/metadata/properties"/>
     <ds:schemaRef ds:uri="http://schemas.openxmlformats.org/package/2006/metadata/core-properties"/>
-    <ds:schemaRef ds:uri="http://purl.org/dc/elements/1.1/"/>
-    <ds:schemaRef ds:uri="http://purl.org/dc/terms/"/>
-    <ds:schemaRef ds:uri="http://schemas.microsoft.com/office/internal/2005/internalDocumentation"/>
   </ds:schemaRefs>
 </ds:datastoreItem>
 </file>
@@ -23926,15 +24105,16 @@
 </file>
 
 <file path=customXml/itemProps3.xml><?xml version="1.0" encoding="utf-8"?>
-<ds:datastoreItem xmlns:ds="http://schemas.openxmlformats.org/officeDocument/2006/customXml" ds:itemID="{575908DB-6131-4DD1-90FB-C4742EE803F7}">
+<ds:datastoreItem xmlns:ds="http://schemas.openxmlformats.org/officeDocument/2006/customXml" ds:itemID="{A14ECCB8-3756-45F9-BC21-1DB5DA524804}">
   <ds:schemaRefs>
-    <ds:schemaRef ds:uri="http://www.w3.org/XML/1998/namespace"/>
-    <ds:schemaRef ds:uri="http://purl.org/dc/dcmitype/"/>
-    <ds:schemaRef ds:uri="http://schemas.microsoft.com/office/2006/documentManagement/types"/>
+    <ds:schemaRef ds:uri="http://schemas.microsoft.com/office/2006/metadata/contentType"/>
+    <ds:schemaRef ds:uri="http://schemas.microsoft.com/office/2006/metadata/properties/metaAttributes"/>
+    <ds:schemaRef ds:uri="http://www.w3.org/2001/XMLSchema"/>
     <ds:schemaRef ds:uri="http://schemas.microsoft.com/office/2006/metadata/properties"/>
+    <ds:schemaRef ds:uri="http://schemas.openxmlformats.org/package/2006/metadata/core-properties"/>
+    <ds:schemaRef ds:uri="http://purl.org/dc/elements/1.1/"/>
     <ds:schemaRef ds:uri="http://purl.org/dc/terms/"/>
-    <ds:schemaRef ds:uri="http://purl.org/dc/elements/1.1/"/>
-    <ds:schemaRef ds:uri="http://schemas.openxmlformats.org/package/2006/metadata/core-properties"/>
+    <ds:schemaRef ds:uri="http://schemas.microsoft.com/office/internal/2005/internalDocumentation"/>
   </ds:schemaRefs>
 </ds:datastoreItem>
 </file>
</xml_diff>